<commit_message>
Update Deep Learning - Part I.pptx
</commit_message>
<xml_diff>
--- a/Deep Learning/Deep Learning - Part I.pptx
+++ b/Deep Learning/Deep Learning - Part I.pptx
@@ -12854,8 +12854,8 @@
 </file>
 
 <file path=customXml/item3.xml><?xml version="1.0" encoding="utf-8"?>
-<ct:contentTypeSchema xmlns:ct="http://schemas.microsoft.com/office/2006/metadata/contentType" xmlns:ma="http://schemas.microsoft.com/office/2006/metadata/properties/metaAttributes" ct:_="" ma:_="" ma:contentTypeName="Document" ma:contentTypeID="0x0101006A7D154A9B6B4745A92074A700A40869" ma:contentTypeVersion="14" ma:contentTypeDescription="Create a new document." ma:contentTypeScope="" ma:versionID="3109fda4e6f8ce3588d9e2c5a71a8eed">
-  <xsd:schema xmlns:xsd="http://www.w3.org/2001/XMLSchema" xmlns:xs="http://www.w3.org/2001/XMLSchema" xmlns:p="http://schemas.microsoft.com/office/2006/metadata/properties" xmlns:ns1="http://schemas.microsoft.com/sharepoint/v3" xmlns:ns2="fcae3b96-bd14-4ee2-8386-a94084e60018" xmlns:ns3="56f87f42-bac6-49e2-b9d5-04744cb514ee" targetNamespace="http://schemas.microsoft.com/office/2006/metadata/properties" ma:root="true" ma:fieldsID="2ba6b9ebbe683be33361f6d78b6d0537" ns1:_="" ns2:_="" ns3:_="">
+<ct:contentTypeSchema xmlns:ct="http://schemas.microsoft.com/office/2006/metadata/contentType" xmlns:ma="http://schemas.microsoft.com/office/2006/metadata/properties/metaAttributes" ct:_="" ma:_="" ma:contentTypeName="Document" ma:contentTypeID="0x0101006A7D154A9B6B4745A92074A700A40869" ma:contentTypeVersion="15" ma:contentTypeDescription="Create a new document." ma:contentTypeScope="" ma:versionID="41f60c3ca4073e840be01347d43b7ceb">
+  <xsd:schema xmlns:xsd="http://www.w3.org/2001/XMLSchema" xmlns:xs="http://www.w3.org/2001/XMLSchema" xmlns:p="http://schemas.microsoft.com/office/2006/metadata/properties" xmlns:ns1="http://schemas.microsoft.com/sharepoint/v3" xmlns:ns2="fcae3b96-bd14-4ee2-8386-a94084e60018" xmlns:ns3="56f87f42-bac6-49e2-b9d5-04744cb514ee" targetNamespace="http://schemas.microsoft.com/office/2006/metadata/properties" ma:root="true" ma:fieldsID="c02c0c2bd9a7fb30972cee9d81e80277" ns1:_="" ns2:_="" ns3:_="">
     <xsd:import namespace="http://schemas.microsoft.com/sharepoint/v3"/>
     <xsd:import namespace="fcae3b96-bd14-4ee2-8386-a94084e60018"/>
     <xsd:import namespace="56f87f42-bac6-49e2-b9d5-04744cb514ee"/>
@@ -12879,6 +12879,7 @@
                 <xsd:element ref="ns2:MediaServiceAutoKeyPoints" minOccurs="0"/>
                 <xsd:element ref="ns2:MediaServiceKeyPoints" minOccurs="0"/>
                 <xsd:element ref="ns2:MediaServiceLocation" minOccurs="0"/>
+                <xsd:element ref="ns2:MediaLengthInSeconds" minOccurs="0"/>
               </xsd:all>
             </xsd:complexType>
           </xsd:element>
@@ -12955,6 +12956,11 @@
     <xsd:element name="MediaServiceLocation" ma:index="21" nillable="true" ma:displayName="Location" ma:internalName="MediaServiceLocation" ma:readOnly="true">
       <xsd:simpleType>
         <xsd:restriction base="dms:Text"/>
+      </xsd:simpleType>
+    </xsd:element>
+    <xsd:element name="MediaLengthInSeconds" ma:index="22" nillable="true" ma:displayName="Length (seconds)" ma:internalName="MediaLengthInSeconds" ma:readOnly="true">
+      <xsd:simpleType>
+        <xsd:restriction base="dms:Unknown"/>
       </xsd:simpleType>
     </xsd:element>
   </xsd:schema>
@@ -13113,21 +13119,5 @@
 </file>
 
 <file path=customXml/itemProps3.xml><?xml version="1.0" encoding="utf-8"?>
-<ds:datastoreItem xmlns:ds="http://schemas.openxmlformats.org/officeDocument/2006/customXml" ds:itemID="{38FFBD5F-6F00-45C5-ACE2-016F0453C4F0}">
-  <ds:schemaRefs>
-    <ds:schemaRef ds:uri="http://schemas.microsoft.com/office/2006/metadata/contentType"/>
-    <ds:schemaRef ds:uri="http://schemas.microsoft.com/office/2006/metadata/properties/metaAttributes"/>
-    <ds:schemaRef ds:uri="http://www.w3.org/2001/XMLSchema"/>
-    <ds:schemaRef ds:uri="http://schemas.microsoft.com/office/2006/metadata/properties"/>
-    <ds:schemaRef ds:uri="http://schemas.microsoft.com/sharepoint/v3"/>
-    <ds:schemaRef ds:uri="fcae3b96-bd14-4ee2-8386-a94084e60018"/>
-    <ds:schemaRef ds:uri="56f87f42-bac6-49e2-b9d5-04744cb514ee"/>
-    <ds:schemaRef ds:uri="http://schemas.microsoft.com/office/2006/documentManagement/types"/>
-    <ds:schemaRef ds:uri="http://schemas.microsoft.com/office/infopath/2007/PartnerControls"/>
-    <ds:schemaRef ds:uri="http://schemas.openxmlformats.org/package/2006/metadata/core-properties"/>
-    <ds:schemaRef ds:uri="http://purl.org/dc/elements/1.1/"/>
-    <ds:schemaRef ds:uri="http://purl.org/dc/terms/"/>
-    <ds:schemaRef ds:uri="http://schemas.microsoft.com/internal/obd"/>
-  </ds:schemaRefs>
-</ds:datastoreItem>
+<ds:datastoreItem xmlns:ds="http://schemas.openxmlformats.org/officeDocument/2006/customXml" ds:itemID="{33F1F363-0BB0-4AE5-91C9-E6B954E016FF}"/>
 </file>
</xml_diff>